<commit_message>
Última alteração na apresentação
Incrementei um slide sobre o PF
</commit_message>
<xml_diff>
--- a/Trab Eng Software/4 parte/Apresentação Etapa 4 - Terceira parte - João Paulo Radd.pptx
+++ b/Trab Eng Software/4 parte/Apresentação Etapa 4 - Terceira parte - João Paulo Radd.pptx
@@ -9,17 +9,18 @@
     <p:sldId id="265" r:id="rId3"/>
     <p:sldId id="257" r:id="rId4"/>
     <p:sldId id="258" r:id="rId5"/>
-    <p:sldId id="268" r:id="rId6"/>
-    <p:sldId id="269" r:id="rId7"/>
-    <p:sldId id="271" r:id="rId8"/>
-    <p:sldId id="272" r:id="rId9"/>
-    <p:sldId id="273" r:id="rId10"/>
-    <p:sldId id="274" r:id="rId11"/>
-    <p:sldId id="275" r:id="rId12"/>
-    <p:sldId id="276" r:id="rId13"/>
-    <p:sldId id="277" r:id="rId14"/>
-    <p:sldId id="278" r:id="rId15"/>
-    <p:sldId id="264" r:id="rId16"/>
+    <p:sldId id="279" r:id="rId6"/>
+    <p:sldId id="268" r:id="rId7"/>
+    <p:sldId id="269" r:id="rId8"/>
+    <p:sldId id="271" r:id="rId9"/>
+    <p:sldId id="272" r:id="rId10"/>
+    <p:sldId id="273" r:id="rId11"/>
+    <p:sldId id="274" r:id="rId12"/>
+    <p:sldId id="275" r:id="rId13"/>
+    <p:sldId id="276" r:id="rId14"/>
+    <p:sldId id="277" r:id="rId15"/>
+    <p:sldId id="278" r:id="rId16"/>
+    <p:sldId id="264" r:id="rId17"/>
   </p:sldIdLst>
   <p:sldSz cx="9144000" cy="6858000" type="screen4x3"/>
   <p:notesSz cx="6858000" cy="9144000"/>
@@ -303,7 +304,7 @@
             <a:fld id="{70E1D29E-5E10-4430-BCE2-814D587183AF}" type="datetimeFigureOut">
               <a:rPr lang="pt-BR" smtClean="0"/>
               <a:pPr/>
-              <a:t>16/10/2014</a:t>
+              <a:t>17/10/2014</a:t>
             </a:fld>
             <a:endParaRPr lang="pt-BR"/>
           </a:p>
@@ -355,7 +356,7 @@
     </p:spTree>
     <p:extLst>
       <p:ext uri="{BB962C8B-B14F-4D97-AF65-F5344CB8AC3E}">
-        <p14:creationId xmlns:p14="http://schemas.microsoft.com/office/powerpoint/2010/main" xmlns="" val="1478311544"/>
+        <p14:creationId xmlns="" xmlns:p14="http://schemas.microsoft.com/office/powerpoint/2010/main" val="1478311544"/>
       </p:ext>
     </p:extLst>
   </p:cSld>
@@ -475,7 +476,7 @@
             <a:fld id="{70E1D29E-5E10-4430-BCE2-814D587183AF}" type="datetimeFigureOut">
               <a:rPr lang="pt-BR" smtClean="0"/>
               <a:pPr/>
-              <a:t>16/10/2014</a:t>
+              <a:t>17/10/2014</a:t>
             </a:fld>
             <a:endParaRPr lang="pt-BR"/>
           </a:p>
@@ -527,7 +528,7 @@
     </p:spTree>
     <p:extLst>
       <p:ext uri="{BB962C8B-B14F-4D97-AF65-F5344CB8AC3E}">
-        <p14:creationId xmlns:p14="http://schemas.microsoft.com/office/powerpoint/2010/main" xmlns="" val="3505800740"/>
+        <p14:creationId xmlns="" xmlns:p14="http://schemas.microsoft.com/office/powerpoint/2010/main" val="3505800740"/>
       </p:ext>
     </p:extLst>
   </p:cSld>
@@ -657,7 +658,7 @@
             <a:fld id="{70E1D29E-5E10-4430-BCE2-814D587183AF}" type="datetimeFigureOut">
               <a:rPr lang="pt-BR" smtClean="0"/>
               <a:pPr/>
-              <a:t>16/10/2014</a:t>
+              <a:t>17/10/2014</a:t>
             </a:fld>
             <a:endParaRPr lang="pt-BR"/>
           </a:p>
@@ -709,7 +710,7 @@
     </p:spTree>
     <p:extLst>
       <p:ext uri="{BB962C8B-B14F-4D97-AF65-F5344CB8AC3E}">
-        <p14:creationId xmlns:p14="http://schemas.microsoft.com/office/powerpoint/2010/main" xmlns="" val="2376402701"/>
+        <p14:creationId xmlns="" xmlns:p14="http://schemas.microsoft.com/office/powerpoint/2010/main" val="2376402701"/>
       </p:ext>
     </p:extLst>
   </p:cSld>
@@ -829,7 +830,7 @@
             <a:fld id="{70E1D29E-5E10-4430-BCE2-814D587183AF}" type="datetimeFigureOut">
               <a:rPr lang="pt-BR" smtClean="0"/>
               <a:pPr/>
-              <a:t>16/10/2014</a:t>
+              <a:t>17/10/2014</a:t>
             </a:fld>
             <a:endParaRPr lang="pt-BR"/>
           </a:p>
@@ -881,7 +882,7 @@
     </p:spTree>
     <p:extLst>
       <p:ext uri="{BB962C8B-B14F-4D97-AF65-F5344CB8AC3E}">
-        <p14:creationId xmlns:p14="http://schemas.microsoft.com/office/powerpoint/2010/main" xmlns="" val="3172837465"/>
+        <p14:creationId xmlns="" xmlns:p14="http://schemas.microsoft.com/office/powerpoint/2010/main" val="3172837465"/>
       </p:ext>
     </p:extLst>
   </p:cSld>
@@ -1077,7 +1078,7 @@
             <a:fld id="{70E1D29E-5E10-4430-BCE2-814D587183AF}" type="datetimeFigureOut">
               <a:rPr lang="pt-BR" smtClean="0"/>
               <a:pPr/>
-              <a:t>16/10/2014</a:t>
+              <a:t>17/10/2014</a:t>
             </a:fld>
             <a:endParaRPr lang="pt-BR"/>
           </a:p>
@@ -1129,7 +1130,7 @@
     </p:spTree>
     <p:extLst>
       <p:ext uri="{BB962C8B-B14F-4D97-AF65-F5344CB8AC3E}">
-        <p14:creationId xmlns:p14="http://schemas.microsoft.com/office/powerpoint/2010/main" xmlns="" val="2539215369"/>
+        <p14:creationId xmlns="" xmlns:p14="http://schemas.microsoft.com/office/powerpoint/2010/main" val="2539215369"/>
       </p:ext>
     </p:extLst>
   </p:cSld>
@@ -1367,7 +1368,7 @@
             <a:fld id="{70E1D29E-5E10-4430-BCE2-814D587183AF}" type="datetimeFigureOut">
               <a:rPr lang="pt-BR" smtClean="0"/>
               <a:pPr/>
-              <a:t>16/10/2014</a:t>
+              <a:t>17/10/2014</a:t>
             </a:fld>
             <a:endParaRPr lang="pt-BR"/>
           </a:p>
@@ -1419,7 +1420,7 @@
     </p:spTree>
     <p:extLst>
       <p:ext uri="{BB962C8B-B14F-4D97-AF65-F5344CB8AC3E}">
-        <p14:creationId xmlns:p14="http://schemas.microsoft.com/office/powerpoint/2010/main" xmlns="" val="1331431120"/>
+        <p14:creationId xmlns="" xmlns:p14="http://schemas.microsoft.com/office/powerpoint/2010/main" val="1331431120"/>
       </p:ext>
     </p:extLst>
   </p:cSld>
@@ -1791,7 +1792,7 @@
             <a:fld id="{70E1D29E-5E10-4430-BCE2-814D587183AF}" type="datetimeFigureOut">
               <a:rPr lang="pt-BR" smtClean="0"/>
               <a:pPr/>
-              <a:t>16/10/2014</a:t>
+              <a:t>17/10/2014</a:t>
             </a:fld>
             <a:endParaRPr lang="pt-BR"/>
           </a:p>
@@ -1843,7 +1844,7 @@
     </p:spTree>
     <p:extLst>
       <p:ext uri="{BB962C8B-B14F-4D97-AF65-F5344CB8AC3E}">
-        <p14:creationId xmlns:p14="http://schemas.microsoft.com/office/powerpoint/2010/main" xmlns="" val="1217087604"/>
+        <p14:creationId xmlns="" xmlns:p14="http://schemas.microsoft.com/office/powerpoint/2010/main" val="1217087604"/>
       </p:ext>
     </p:extLst>
   </p:cSld>
@@ -1911,7 +1912,7 @@
             <a:fld id="{70E1D29E-5E10-4430-BCE2-814D587183AF}" type="datetimeFigureOut">
               <a:rPr lang="pt-BR" smtClean="0"/>
               <a:pPr/>
-              <a:t>16/10/2014</a:t>
+              <a:t>17/10/2014</a:t>
             </a:fld>
             <a:endParaRPr lang="pt-BR"/>
           </a:p>
@@ -1963,7 +1964,7 @@
     </p:spTree>
     <p:extLst>
       <p:ext uri="{BB962C8B-B14F-4D97-AF65-F5344CB8AC3E}">
-        <p14:creationId xmlns:p14="http://schemas.microsoft.com/office/powerpoint/2010/main" xmlns="" val="1097157162"/>
+        <p14:creationId xmlns="" xmlns:p14="http://schemas.microsoft.com/office/powerpoint/2010/main" val="1097157162"/>
       </p:ext>
     </p:extLst>
   </p:cSld>
@@ -2008,7 +2009,7 @@
             <a:fld id="{70E1D29E-5E10-4430-BCE2-814D587183AF}" type="datetimeFigureOut">
               <a:rPr lang="pt-BR" smtClean="0"/>
               <a:pPr/>
-              <a:t>16/10/2014</a:t>
+              <a:t>17/10/2014</a:t>
             </a:fld>
             <a:endParaRPr lang="pt-BR"/>
           </a:p>
@@ -2060,7 +2061,7 @@
     </p:spTree>
     <p:extLst>
       <p:ext uri="{BB962C8B-B14F-4D97-AF65-F5344CB8AC3E}">
-        <p14:creationId xmlns:p14="http://schemas.microsoft.com/office/powerpoint/2010/main" xmlns="" val="1679169195"/>
+        <p14:creationId xmlns="" xmlns:p14="http://schemas.microsoft.com/office/powerpoint/2010/main" val="1679169195"/>
       </p:ext>
     </p:extLst>
   </p:cSld>
@@ -2287,7 +2288,7 @@
             <a:fld id="{70E1D29E-5E10-4430-BCE2-814D587183AF}" type="datetimeFigureOut">
               <a:rPr lang="pt-BR" smtClean="0"/>
               <a:pPr/>
-              <a:t>16/10/2014</a:t>
+              <a:t>17/10/2014</a:t>
             </a:fld>
             <a:endParaRPr lang="pt-BR"/>
           </a:p>
@@ -2339,7 +2340,7 @@
     </p:spTree>
     <p:extLst>
       <p:ext uri="{BB962C8B-B14F-4D97-AF65-F5344CB8AC3E}">
-        <p14:creationId xmlns:p14="http://schemas.microsoft.com/office/powerpoint/2010/main" xmlns="" val="526725474"/>
+        <p14:creationId xmlns="" xmlns:p14="http://schemas.microsoft.com/office/powerpoint/2010/main" val="526725474"/>
       </p:ext>
     </p:extLst>
   </p:cSld>
@@ -2542,7 +2543,7 @@
             <a:fld id="{70E1D29E-5E10-4430-BCE2-814D587183AF}" type="datetimeFigureOut">
               <a:rPr lang="pt-BR" smtClean="0"/>
               <a:pPr/>
-              <a:t>16/10/2014</a:t>
+              <a:t>17/10/2014</a:t>
             </a:fld>
             <a:endParaRPr lang="pt-BR"/>
           </a:p>
@@ -2594,7 +2595,7 @@
     </p:spTree>
     <p:extLst>
       <p:ext uri="{BB962C8B-B14F-4D97-AF65-F5344CB8AC3E}">
-        <p14:creationId xmlns:p14="http://schemas.microsoft.com/office/powerpoint/2010/main" xmlns="" val="620370457"/>
+        <p14:creationId xmlns="" xmlns:p14="http://schemas.microsoft.com/office/powerpoint/2010/main" val="620370457"/>
       </p:ext>
     </p:extLst>
   </p:cSld>
@@ -2762,7 +2763,7 @@
             <a:fld id="{70E1D29E-5E10-4430-BCE2-814D587183AF}" type="datetimeFigureOut">
               <a:rPr lang="pt-BR" smtClean="0"/>
               <a:pPr/>
-              <a:t>16/10/2014</a:t>
+              <a:t>17/10/2014</a:t>
             </a:fld>
             <a:endParaRPr lang="pt-BR"/>
           </a:p>
@@ -2850,7 +2851,7 @@
     </p:spTree>
     <p:extLst>
       <p:ext uri="{BB962C8B-B14F-4D97-AF65-F5344CB8AC3E}">
-        <p14:creationId xmlns:p14="http://schemas.microsoft.com/office/powerpoint/2010/main" xmlns="" val="1535434443"/>
+        <p14:creationId xmlns="" xmlns:p14="http://schemas.microsoft.com/office/powerpoint/2010/main" val="1535434443"/>
       </p:ext>
     </p:extLst>
   </p:cSld>
@@ -3184,7 +3185,7 @@
           <a:blip r:embed="rId2" cstate="print">
             <a:extLst>
               <a:ext uri="{28A0092B-C50C-407E-A947-70E740481C1C}">
-                <a14:useLocalDpi xmlns:a14="http://schemas.microsoft.com/office/drawing/2010/main" xmlns="" val="0"/>
+                <a14:useLocalDpi xmlns="" xmlns:a14="http://schemas.microsoft.com/office/drawing/2010/main" val="0"/>
               </a:ext>
             </a:extLst>
           </a:blip>
@@ -3204,7 +3205,7 @@
           <a:noFill/>
           <a:extLst>
             <a:ext uri="{909E8E84-426E-40DD-AFC4-6F175D3DCCD1}">
-              <a14:hiddenFill xmlns:a14="http://schemas.microsoft.com/office/drawing/2010/main" xmlns="">
+              <a14:hiddenFill xmlns="" xmlns:a14="http://schemas.microsoft.com/office/drawing/2010/main">
                 <a:solidFill>
                   <a:srgbClr val="FFFFFF"/>
                 </a:solidFill>
@@ -3216,7 +3217,7 @@
     </p:spTree>
     <p:extLst>
       <p:ext uri="{BB962C8B-B14F-4D97-AF65-F5344CB8AC3E}">
-        <p14:creationId xmlns:p14="http://schemas.microsoft.com/office/powerpoint/2010/main" xmlns="" val="1378676636"/>
+        <p14:creationId xmlns="" xmlns:p14="http://schemas.microsoft.com/office/powerpoint/2010/main" val="1378676636"/>
       </p:ext>
     </p:extLst>
   </p:cSld>
@@ -3336,6 +3337,198 @@
           <a:p>
             <a:r>
               <a:rPr lang="pt-BR" dirty="0" smtClean="0"/>
+              <a:t>Tabela dos Pesos</a:t>
+            </a:r>
+            <a:endParaRPr lang="pt-BR" dirty="0"/>
+          </a:p>
+        </p:txBody>
+      </p:sp>
+      <p:pic>
+        <p:nvPicPr>
+          <p:cNvPr id="1026" name="Picture 2"/>
+          <p:cNvPicPr>
+            <a:picLocks noGrp="1" noChangeAspect="1" noChangeArrowheads="1"/>
+          </p:cNvPicPr>
+          <p:nvPr>
+            <p:ph idx="1"/>
+          </p:nvPr>
+        </p:nvPicPr>
+        <p:blipFill>
+          <a:blip r:embed="rId2" cstate="print">
+            <a:extLst>
+              <a:ext uri="{28A0092B-C50C-407E-A947-70E740481C1C}">
+                <a14:useLocalDpi xmlns="" xmlns:a14="http://schemas.microsoft.com/office/drawing/2010/main" val="0"/>
+              </a:ext>
+            </a:extLst>
+          </a:blip>
+          <a:srcRect/>
+          <a:stretch>
+            <a:fillRect/>
+          </a:stretch>
+        </p:blipFill>
+        <p:spPr bwMode="auto">
+          <a:xfrm>
+            <a:off x="1907704" y="1244078"/>
+            <a:ext cx="5400600" cy="5456468"/>
+          </a:xfrm>
+          <a:prstGeom prst="rect">
+            <a:avLst/>
+          </a:prstGeom>
+          <a:noFill/>
+          <a:ln>
+            <a:noFill/>
+          </a:ln>
+          <a:extLst>
+            <a:ext uri="{909E8E84-426E-40DD-AFC4-6F175D3DCCD1}">
+              <a14:hiddenFill xmlns="" xmlns:a14="http://schemas.microsoft.com/office/drawing/2010/main">
+                <a:solidFill>
+                  <a:schemeClr val="accent1"/>
+                </a:solidFill>
+              </a14:hiddenFill>
+            </a:ext>
+            <a:ext uri="{91240B29-F687-4F45-9708-019B960494DF}">
+              <a14:hiddenLine xmlns="" xmlns:a14="http://schemas.microsoft.com/office/drawing/2010/main" w="9525">
+                <a:solidFill>
+                  <a:schemeClr val="tx1"/>
+                </a:solidFill>
+                <a:miter lim="800000"/>
+                <a:headEnd/>
+                <a:tailEnd/>
+              </a14:hiddenLine>
+            </a:ext>
+          </a:extLst>
+        </p:spPr>
+      </p:pic>
+    </p:spTree>
+    <p:extLst>
+      <p:ext uri="{BB962C8B-B14F-4D97-AF65-F5344CB8AC3E}">
+        <p14:creationId xmlns="" xmlns:p14="http://schemas.microsoft.com/office/powerpoint/2010/main" val="4257421259"/>
+      </p:ext>
+    </p:extLst>
+  </p:cSld>
+  <p:clrMapOvr>
+    <a:masterClrMapping/>
+  </p:clrMapOvr>
+  <p:timing>
+    <p:tnLst>
+      <p:par>
+        <p:cTn id="1" dur="indefinite" restart="never" nodeType="tmRoot">
+          <p:childTnLst>
+            <p:seq concurrent="1" nextAc="seek">
+              <p:cTn id="2" dur="indefinite" nodeType="mainSeq">
+                <p:childTnLst>
+                  <p:par>
+                    <p:cTn id="3" fill="hold">
+                      <p:stCondLst>
+                        <p:cond delay="indefinite"/>
+                      </p:stCondLst>
+                      <p:childTnLst>
+                        <p:par>
+                          <p:cTn id="4" fill="hold">
+                            <p:stCondLst>
+                              <p:cond delay="0"/>
+                            </p:stCondLst>
+                            <p:childTnLst>
+                              <p:par>
+                                <p:cTn id="5" presetID="22" presetClass="entr" presetSubtype="4" fill="hold" nodeType="clickEffect">
+                                  <p:stCondLst>
+                                    <p:cond delay="0"/>
+                                  </p:stCondLst>
+                                  <p:childTnLst>
+                                    <p:set>
+                                      <p:cBhvr>
+                                        <p:cTn id="6" dur="1" fill="hold">
+                                          <p:stCondLst>
+                                            <p:cond delay="0"/>
+                                          </p:stCondLst>
+                                        </p:cTn>
+                                        <p:tgtEl>
+                                          <p:spTgt spid="1026"/>
+                                        </p:tgtEl>
+                                        <p:attrNameLst>
+                                          <p:attrName>style.visibility</p:attrName>
+                                        </p:attrNameLst>
+                                      </p:cBhvr>
+                                      <p:to>
+                                        <p:strVal val="visible"/>
+                                      </p:to>
+                                    </p:set>
+                                    <p:animEffect transition="in" filter="wipe(down)">
+                                      <p:cBhvr>
+                                        <p:cTn id="7" dur="500"/>
+                                        <p:tgtEl>
+                                          <p:spTgt spid="1026"/>
+                                        </p:tgtEl>
+                                      </p:cBhvr>
+                                    </p:animEffect>
+                                  </p:childTnLst>
+                                </p:cTn>
+                              </p:par>
+                            </p:childTnLst>
+                          </p:cTn>
+                        </p:par>
+                      </p:childTnLst>
+                    </p:cTn>
+                  </p:par>
+                </p:childTnLst>
+              </p:cTn>
+              <p:prevCondLst>
+                <p:cond evt="onPrev" delay="0">
+                  <p:tgtEl>
+                    <p:sldTgt/>
+                  </p:tgtEl>
+                </p:cond>
+              </p:prevCondLst>
+              <p:nextCondLst>
+                <p:cond evt="onNext" delay="0">
+                  <p:tgtEl>
+                    <p:sldTgt/>
+                  </p:tgtEl>
+                </p:cond>
+              </p:nextCondLst>
+            </p:seq>
+          </p:childTnLst>
+        </p:cTn>
+      </p:par>
+    </p:tnLst>
+  </p:timing>
+</p:sld>
+</file>
+
+<file path=ppt/slides/slide11.xml><?xml version="1.0" encoding="utf-8"?>
+<p:sld xmlns:a="http://schemas.openxmlformats.org/drawingml/2006/main" xmlns:r="http://schemas.openxmlformats.org/officeDocument/2006/relationships" xmlns:p="http://schemas.openxmlformats.org/presentationml/2006/main">
+  <p:cSld>
+    <p:spTree>
+      <p:nvGrpSpPr>
+        <p:cNvPr id="1" name=""/>
+        <p:cNvGrpSpPr/>
+        <p:nvPr/>
+      </p:nvGrpSpPr>
+      <p:grpSpPr>
+        <a:xfrm>
+          <a:off x="0" y="0"/>
+          <a:ext cx="0" cy="0"/>
+          <a:chOff x="0" y="0"/>
+          <a:chExt cx="0" cy="0"/>
+        </a:xfrm>
+      </p:grpSpPr>
+      <p:sp>
+        <p:nvSpPr>
+          <p:cNvPr id="2" name="Título 1"/>
+          <p:cNvSpPr>
+            <a:spLocks noGrp="1"/>
+          </p:cNvSpPr>
+          <p:nvPr>
+            <p:ph type="title"/>
+          </p:nvPr>
+        </p:nvSpPr>
+        <p:spPr/>
+        <p:txBody>
+          <a:bodyPr/>
+          <a:lstStyle/>
+          <a:p>
+            <a:r>
+              <a:rPr lang="pt-BR" dirty="0" smtClean="0"/>
               <a:t>Tabela ALI </a:t>
             </a:r>
             <a:endParaRPr lang="pt-BR" dirty="0"/>
@@ -5125,7 +5318,7 @@
     </p:spTree>
     <p:extLst>
       <p:ext uri="{BB962C8B-B14F-4D97-AF65-F5344CB8AC3E}">
-        <p14:creationId xmlns:p14="http://schemas.microsoft.com/office/powerpoint/2010/main" xmlns="" val="3105382629"/>
+        <p14:creationId xmlns="" xmlns:p14="http://schemas.microsoft.com/office/powerpoint/2010/main" val="3105382629"/>
       </p:ext>
     </p:extLst>
   </p:cSld>
@@ -5259,7 +5452,7 @@
 </p:sld>
 </file>
 
-<file path=ppt/slides/slide11.xml><?xml version="1.0" encoding="utf-8"?>
+<file path=ppt/slides/slide12.xml><?xml version="1.0" encoding="utf-8"?>
 <p:sld xmlns:a="http://schemas.openxmlformats.org/drawingml/2006/main" xmlns:r="http://schemas.openxmlformats.org/officeDocument/2006/relationships" xmlns:p="http://schemas.openxmlformats.org/presentationml/2006/main">
   <p:cSld>
     <p:spTree>
@@ -6590,7 +6783,7 @@
 </p:sld>
 </file>
 
-<file path=ppt/slides/slide12.xml><?xml version="1.0" encoding="utf-8"?>
+<file path=ppt/slides/slide13.xml><?xml version="1.0" encoding="utf-8"?>
 <p:sld xmlns:a="http://schemas.openxmlformats.org/drawingml/2006/main" xmlns:r="http://schemas.openxmlformats.org/officeDocument/2006/relationships" xmlns:p="http://schemas.openxmlformats.org/presentationml/2006/main">
   <p:cSld>
     <p:spTree>
@@ -8238,7 +8431,7 @@
 </p:sld>
 </file>
 
-<file path=ppt/slides/slide13.xml><?xml version="1.0" encoding="utf-8"?>
+<file path=ppt/slides/slide14.xml><?xml version="1.0" encoding="utf-8"?>
 <p:sld xmlns:a="http://schemas.openxmlformats.org/drawingml/2006/main" xmlns:r="http://schemas.openxmlformats.org/officeDocument/2006/relationships" xmlns:p="http://schemas.openxmlformats.org/presentationml/2006/main">
   <p:cSld>
     <p:spTree>
@@ -11441,7 +11634,7 @@
 </p:sld>
 </file>
 
-<file path=ppt/slides/slide14.xml><?xml version="1.0" encoding="utf-8"?>
+<file path=ppt/slides/slide15.xml><?xml version="1.0" encoding="utf-8"?>
 <p:sld xmlns:a="http://schemas.openxmlformats.org/drawingml/2006/main" xmlns:r="http://schemas.openxmlformats.org/officeDocument/2006/relationships" xmlns:p="http://schemas.openxmlformats.org/presentationml/2006/main">
   <p:cSld>
     <p:spTree>
@@ -12204,7 +12397,7 @@
 </p:sld>
 </file>
 
-<file path=ppt/slides/slide15.xml><?xml version="1.0" encoding="utf-8"?>
+<file path=ppt/slides/slide16.xml><?xml version="1.0" encoding="utf-8"?>
 <p:sld xmlns:a="http://schemas.openxmlformats.org/drawingml/2006/main" xmlns:r="http://schemas.openxmlformats.org/officeDocument/2006/relationships" xmlns:p="http://schemas.openxmlformats.org/presentationml/2006/main">
   <p:cSld>
     <p:spTree>
@@ -12989,7 +13182,7 @@
     </p:spTree>
     <p:extLst>
       <p:ext uri="{BB962C8B-B14F-4D97-AF65-F5344CB8AC3E}">
-        <p14:creationId xmlns:p14="http://schemas.microsoft.com/office/powerpoint/2010/main" xmlns="" val="1567074162"/>
+        <p14:creationId xmlns="" xmlns:p14="http://schemas.microsoft.com/office/powerpoint/2010/main" val="1567074162"/>
       </p:ext>
     </p:extLst>
   </p:cSld>
@@ -13605,7 +13798,7 @@
         <p:spPr/>
         <p:txBody>
           <a:bodyPr>
-            <a:normAutofit fontScale="92500" lnSpcReduction="10000"/>
+            <a:normAutofit/>
           </a:bodyPr>
           <a:lstStyle/>
           <a:p>
@@ -13652,12 +13845,6 @@
             <a:endParaRPr lang="pt-BR" dirty="0" smtClean="0"/>
           </a:p>
           <a:p>
-            <a:r>
-              <a:rPr lang="pt-BR" dirty="0" smtClean="0"/>
-              <a:t>Importante para se ter de forma prévia um cálculo que quanto será gasto no sistema</a:t>
-            </a:r>
-          </a:p>
-          <a:p>
             <a:endParaRPr lang="pt-BR" dirty="0" smtClean="0"/>
           </a:p>
           <a:p>
@@ -13674,7 +13861,7 @@
     </p:spTree>
     <p:extLst>
       <p:ext uri="{BB962C8B-B14F-4D97-AF65-F5344CB8AC3E}">
-        <p14:creationId xmlns:p14="http://schemas.microsoft.com/office/powerpoint/2010/main" xmlns="" val="526639743"/>
+        <p14:creationId xmlns="" xmlns:p14="http://schemas.microsoft.com/office/powerpoint/2010/main" val="526639743"/>
       </p:ext>
     </p:extLst>
   </p:cSld>
@@ -14135,27 +14322,172 @@
                       </p:childTnLst>
                     </p:cTn>
                   </p:par>
+                </p:childTnLst>
+              </p:cTn>
+              <p:prevCondLst>
+                <p:cond evt="onPrev" delay="0">
+                  <p:tgtEl>
+                    <p:sldTgt/>
+                  </p:tgtEl>
+                </p:cond>
+              </p:prevCondLst>
+              <p:nextCondLst>
+                <p:cond evt="onNext" delay="0">
+                  <p:tgtEl>
+                    <p:sldTgt/>
+                  </p:tgtEl>
+                </p:cond>
+              </p:nextCondLst>
+            </p:seq>
+          </p:childTnLst>
+        </p:cTn>
+      </p:par>
+    </p:tnLst>
+    <p:bldLst>
+      <p:bldP spid="3" grpId="0" uiExpand="1" build="p"/>
+    </p:bldLst>
+  </p:timing>
+</p:sld>
+</file>
+
+<file path=ppt/slides/slide5.xml><?xml version="1.0" encoding="utf-8"?>
+<p:sld xmlns:a="http://schemas.openxmlformats.org/drawingml/2006/main" xmlns:r="http://schemas.openxmlformats.org/officeDocument/2006/relationships" xmlns:p="http://schemas.openxmlformats.org/presentationml/2006/main">
+  <p:cSld>
+    <p:spTree>
+      <p:nvGrpSpPr>
+        <p:cNvPr id="1" name=""/>
+        <p:cNvGrpSpPr/>
+        <p:nvPr/>
+      </p:nvGrpSpPr>
+      <p:grpSpPr>
+        <a:xfrm>
+          <a:off x="0" y="0"/>
+          <a:ext cx="0" cy="0"/>
+          <a:chOff x="0" y="0"/>
+          <a:chExt cx="0" cy="0"/>
+        </a:xfrm>
+      </p:grpSpPr>
+      <p:sp>
+        <p:nvSpPr>
+          <p:cNvPr id="2" name="Título 1"/>
+          <p:cNvSpPr>
+            <a:spLocks noGrp="1"/>
+          </p:cNvSpPr>
+          <p:nvPr>
+            <p:ph type="title"/>
+          </p:nvPr>
+        </p:nvSpPr>
+        <p:spPr/>
+        <p:txBody>
+          <a:bodyPr>
+            <a:normAutofit/>
+          </a:bodyPr>
+          <a:lstStyle/>
+          <a:p>
+            <a:r>
+              <a:rPr lang="pt-BR" b="1" dirty="0" smtClean="0"/>
+              <a:t>PONTO DE FUNÇÃO</a:t>
+            </a:r>
+            <a:endParaRPr lang="pt-BR" dirty="0"/>
+          </a:p>
+        </p:txBody>
+      </p:sp>
+      <p:sp>
+        <p:nvSpPr>
+          <p:cNvPr id="3" name="Espaço Reservado para Conteúdo 2"/>
+          <p:cNvSpPr>
+            <a:spLocks noGrp="1"/>
+          </p:cNvSpPr>
+          <p:nvPr>
+            <p:ph idx="1"/>
+          </p:nvPr>
+        </p:nvSpPr>
+        <p:spPr/>
+        <p:txBody>
+          <a:bodyPr>
+            <a:normAutofit/>
+          </a:bodyPr>
+          <a:lstStyle/>
+          <a:p>
+            <a:r>
+              <a:rPr lang="pt-BR" dirty="0" smtClean="0"/>
+              <a:t>Importante </a:t>
+            </a:r>
+            <a:r>
+              <a:rPr lang="pt-BR" dirty="0" smtClean="0"/>
+              <a:t>para se ter de forma prévia um cálculo que quanto será gasto no </a:t>
+            </a:r>
+            <a:r>
+              <a:rPr lang="pt-BR" dirty="0" smtClean="0"/>
+              <a:t>sistema</a:t>
+            </a:r>
+          </a:p>
+          <a:p>
+            <a:r>
+              <a:rPr lang="pt-BR" dirty="0" smtClean="0"/>
+              <a:t>O gasto é calculado ao multiplicar o total do PF pelo custo/hora de um funcionário</a:t>
+            </a:r>
+            <a:endParaRPr lang="pt-BR" dirty="0" smtClean="0"/>
+          </a:p>
+          <a:p>
+            <a:endParaRPr lang="pt-BR" dirty="0" smtClean="0"/>
+          </a:p>
+          <a:p>
+            <a:endParaRPr lang="pt-BR" dirty="0" smtClean="0"/>
+          </a:p>
+          <a:p>
+            <a:pPr lvl="1">
+              <a:buNone/>
+            </a:pPr>
+            <a:endParaRPr lang="pt-BR" dirty="0" smtClean="0"/>
+          </a:p>
+          <a:p>
+            <a:endParaRPr lang="pt-BR" dirty="0"/>
+          </a:p>
+        </p:txBody>
+      </p:sp>
+    </p:spTree>
+    <p:extLst>
+      <p:ext uri="{BB962C8B-B14F-4D97-AF65-F5344CB8AC3E}">
+        <p14:creationId xmlns="" xmlns:p14="http://schemas.microsoft.com/office/powerpoint/2010/main" val="526639743"/>
+      </p:ext>
+    </p:extLst>
+  </p:cSld>
+  <p:clrMapOvr>
+    <a:masterClrMapping/>
+  </p:clrMapOvr>
+  <p:transition>
+    <p:push dir="u"/>
+  </p:transition>
+  <p:timing>
+    <p:tnLst>
+      <p:par>
+        <p:cTn id="1" dur="indefinite" restart="never" nodeType="tmRoot">
+          <p:childTnLst>
+            <p:seq concurrent="1" nextAc="seek">
+              <p:cTn id="2" dur="indefinite" nodeType="mainSeq">
+                <p:childTnLst>
                   <p:par>
-                    <p:cTn id="25" fill="hold">
+                    <p:cTn id="3" fill="hold">
                       <p:stCondLst>
                         <p:cond delay="indefinite"/>
                       </p:stCondLst>
                       <p:childTnLst>
                         <p:par>
-                          <p:cTn id="26" fill="hold">
+                          <p:cTn id="4" fill="hold">
                             <p:stCondLst>
                               <p:cond delay="0"/>
                             </p:stCondLst>
                             <p:childTnLst>
                               <p:par>
-                                <p:cTn id="27" presetID="2" presetClass="entr" presetSubtype="4" fill="hold" grpId="0" nodeType="clickEffect">
+                                <p:cTn id="5" presetID="2" presetClass="entr" presetSubtype="4" fill="hold" grpId="0" nodeType="clickEffect">
                                   <p:stCondLst>
                                     <p:cond delay="0"/>
                                   </p:stCondLst>
                                   <p:childTnLst>
                                     <p:set>
                                       <p:cBhvr>
-                                        <p:cTn id="28" dur="1" fill="hold">
+                                        <p:cTn id="6" dur="1" fill="hold">
                                           <p:stCondLst>
                                             <p:cond delay="0"/>
                                           </p:stCondLst>
@@ -14163,7 +14495,7 @@
                                         <p:tgtEl>
                                           <p:spTgt spid="3">
                                             <p:txEl>
-                                              <p:pRg st="5" end="5"/>
+                                              <p:pRg st="0" end="0"/>
                                             </p:txEl>
                                           </p:spTgt>
                                         </p:tgtEl>
@@ -14177,11 +14509,11 @@
                                     </p:set>
                                     <p:anim calcmode="lin" valueType="num">
                                       <p:cBhvr additive="base">
-                                        <p:cTn id="29" dur="500" fill="hold"/>
+                                        <p:cTn id="7" dur="500" fill="hold"/>
                                         <p:tgtEl>
                                           <p:spTgt spid="3">
                                             <p:txEl>
-                                              <p:pRg st="5" end="5"/>
+                                              <p:pRg st="0" end="0"/>
                                             </p:txEl>
                                           </p:spTgt>
                                         </p:tgtEl>
@@ -14204,11 +14536,114 @@
                                     </p:anim>
                                     <p:anim calcmode="lin" valueType="num">
                                       <p:cBhvr additive="base">
-                                        <p:cTn id="30" dur="500" fill="hold"/>
+                                        <p:cTn id="8" dur="500" fill="hold"/>
                                         <p:tgtEl>
                                           <p:spTgt spid="3">
                                             <p:txEl>
-                                              <p:pRg st="5" end="5"/>
+                                              <p:pRg st="0" end="0"/>
+                                            </p:txEl>
+                                          </p:spTgt>
+                                        </p:tgtEl>
+                                        <p:attrNameLst>
+                                          <p:attrName>ppt_y</p:attrName>
+                                        </p:attrNameLst>
+                                      </p:cBhvr>
+                                      <p:tavLst>
+                                        <p:tav tm="0">
+                                          <p:val>
+                                            <p:strVal val="1+#ppt_h/2"/>
+                                          </p:val>
+                                        </p:tav>
+                                        <p:tav tm="100000">
+                                          <p:val>
+                                            <p:strVal val="#ppt_y"/>
+                                          </p:val>
+                                        </p:tav>
+                                      </p:tavLst>
+                                    </p:anim>
+                                  </p:childTnLst>
+                                </p:cTn>
+                              </p:par>
+                            </p:childTnLst>
+                          </p:cTn>
+                        </p:par>
+                      </p:childTnLst>
+                    </p:cTn>
+                  </p:par>
+                  <p:par>
+                    <p:cTn id="9" fill="hold">
+                      <p:stCondLst>
+                        <p:cond delay="indefinite"/>
+                      </p:stCondLst>
+                      <p:childTnLst>
+                        <p:par>
+                          <p:cTn id="10" fill="hold">
+                            <p:stCondLst>
+                              <p:cond delay="0"/>
+                            </p:stCondLst>
+                            <p:childTnLst>
+                              <p:par>
+                                <p:cTn id="11" presetID="2" presetClass="entr" presetSubtype="4" fill="hold" grpId="0" nodeType="clickEffect">
+                                  <p:stCondLst>
+                                    <p:cond delay="0"/>
+                                  </p:stCondLst>
+                                  <p:childTnLst>
+                                    <p:set>
+                                      <p:cBhvr>
+                                        <p:cTn id="12" dur="1" fill="hold">
+                                          <p:stCondLst>
+                                            <p:cond delay="0"/>
+                                          </p:stCondLst>
+                                        </p:cTn>
+                                        <p:tgtEl>
+                                          <p:spTgt spid="3">
+                                            <p:txEl>
+                                              <p:pRg st="1" end="1"/>
+                                            </p:txEl>
+                                          </p:spTgt>
+                                        </p:tgtEl>
+                                        <p:attrNameLst>
+                                          <p:attrName>style.visibility</p:attrName>
+                                        </p:attrNameLst>
+                                      </p:cBhvr>
+                                      <p:to>
+                                        <p:strVal val="visible"/>
+                                      </p:to>
+                                    </p:set>
+                                    <p:anim calcmode="lin" valueType="num">
+                                      <p:cBhvr additive="base">
+                                        <p:cTn id="13" dur="500" fill="hold"/>
+                                        <p:tgtEl>
+                                          <p:spTgt spid="3">
+                                            <p:txEl>
+                                              <p:pRg st="1" end="1"/>
+                                            </p:txEl>
+                                          </p:spTgt>
+                                        </p:tgtEl>
+                                        <p:attrNameLst>
+                                          <p:attrName>ppt_x</p:attrName>
+                                        </p:attrNameLst>
+                                      </p:cBhvr>
+                                      <p:tavLst>
+                                        <p:tav tm="0">
+                                          <p:val>
+                                            <p:strVal val="#ppt_x"/>
+                                          </p:val>
+                                        </p:tav>
+                                        <p:tav tm="100000">
+                                          <p:val>
+                                            <p:strVal val="#ppt_x"/>
+                                          </p:val>
+                                        </p:tav>
+                                      </p:tavLst>
+                                    </p:anim>
+                                    <p:anim calcmode="lin" valueType="num">
+                                      <p:cBhvr additive="base">
+                                        <p:cTn id="14" dur="500" fill="hold"/>
+                                        <p:tgtEl>
+                                          <p:spTgt spid="3">
+                                            <p:txEl>
+                                              <p:pRg st="1" end="1"/>
                                             </p:txEl>
                                           </p:spTgt>
                                         </p:tgtEl>
@@ -14260,13 +14695,13 @@
       </p:par>
     </p:tnLst>
     <p:bldLst>
-      <p:bldP spid="3" grpId="0" uiExpand="1" build="p"/>
+      <p:bldP spid="3" grpId="0" build="p"/>
     </p:bldLst>
   </p:timing>
 </p:sld>
 </file>
 
-<file path=ppt/slides/slide5.xml><?xml version="1.0" encoding="utf-8"?>
+<file path=ppt/slides/slide6.xml><?xml version="1.0" encoding="utf-8"?>
 <p:sld xmlns:a="http://schemas.openxmlformats.org/drawingml/2006/main" xmlns:r="http://schemas.openxmlformats.org/officeDocument/2006/relationships" xmlns:p="http://schemas.openxmlformats.org/presentationml/2006/main">
   <p:cSld>
     <p:spTree>
@@ -14371,7 +14806,7 @@
     </p:spTree>
     <p:extLst>
       <p:ext uri="{BB962C8B-B14F-4D97-AF65-F5344CB8AC3E}">
-        <p14:creationId xmlns:p14="http://schemas.microsoft.com/office/powerpoint/2010/main" xmlns="" val="2063192166"/>
+        <p14:creationId xmlns="" xmlns:p14="http://schemas.microsoft.com/office/powerpoint/2010/main" val="2063192166"/>
       </p:ext>
     </p:extLst>
   </p:cSld>
@@ -14860,7 +15295,7 @@
 </p:sld>
 </file>
 
-<file path=ppt/slides/slide6.xml><?xml version="1.0" encoding="utf-8"?>
+<file path=ppt/slides/slide7.xml><?xml version="1.0" encoding="utf-8"?>
 <p:sld xmlns:a="http://schemas.openxmlformats.org/drawingml/2006/main" xmlns:r="http://schemas.openxmlformats.org/officeDocument/2006/relationships" xmlns:p="http://schemas.openxmlformats.org/presentationml/2006/main">
   <p:cSld>
     <p:spTree>
@@ -14947,7 +15382,7 @@
     </p:spTree>
     <p:extLst>
       <p:ext uri="{BB962C8B-B14F-4D97-AF65-F5344CB8AC3E}">
-        <p14:creationId xmlns:p14="http://schemas.microsoft.com/office/powerpoint/2010/main" xmlns="" val="698202521"/>
+        <p14:creationId xmlns="" xmlns:p14="http://schemas.microsoft.com/office/powerpoint/2010/main" val="698202521"/>
       </p:ext>
     </p:extLst>
   </p:cSld>
@@ -15266,7 +15701,7 @@
 </p:sld>
 </file>
 
-<file path=ppt/slides/slide7.xml><?xml version="1.0" encoding="utf-8"?>
+<file path=ppt/slides/slide8.xml><?xml version="1.0" encoding="utf-8"?>
 <p:sld xmlns:a="http://schemas.openxmlformats.org/drawingml/2006/main" xmlns:r="http://schemas.openxmlformats.org/officeDocument/2006/relationships" xmlns:p="http://schemas.openxmlformats.org/presentationml/2006/main">
   <p:cSld>
     <p:spTree>
@@ -15365,7 +15800,7 @@
     </p:spTree>
     <p:extLst>
       <p:ext uri="{BB962C8B-B14F-4D97-AF65-F5344CB8AC3E}">
-        <p14:creationId xmlns:p14="http://schemas.microsoft.com/office/powerpoint/2010/main" xmlns="" val="1599091294"/>
+        <p14:creationId xmlns="" xmlns:p14="http://schemas.microsoft.com/office/powerpoint/2010/main" val="1599091294"/>
       </p:ext>
     </p:extLst>
   </p:cSld>
@@ -15854,7 +16289,7 @@
 </p:sld>
 </file>
 
-<file path=ppt/slides/slide8.xml><?xml version="1.0" encoding="utf-8"?>
+<file path=ppt/slides/slide9.xml><?xml version="1.0" encoding="utf-8"?>
 <p:sld xmlns:a="http://schemas.openxmlformats.org/drawingml/2006/main" xmlns:r="http://schemas.openxmlformats.org/officeDocument/2006/relationships" xmlns:p="http://schemas.openxmlformats.org/presentationml/2006/main">
   <p:cSld>
     <p:spTree>
@@ -15936,7 +16371,7 @@
     </p:spTree>
     <p:extLst>
       <p:ext uri="{BB962C8B-B14F-4D97-AF65-F5344CB8AC3E}">
-        <p14:creationId xmlns:p14="http://schemas.microsoft.com/office/powerpoint/2010/main" xmlns="" val="1542799037"/>
+        <p14:creationId xmlns="" xmlns:p14="http://schemas.microsoft.com/office/powerpoint/2010/main" val="1542799037"/>
       </p:ext>
     </p:extLst>
   </p:cSld>
@@ -16287,198 +16722,6 @@
     <p:bldLst>
       <p:bldP spid="3" grpId="0" build="p"/>
     </p:bldLst>
-  </p:timing>
-</p:sld>
-</file>
-
-<file path=ppt/slides/slide9.xml><?xml version="1.0" encoding="utf-8"?>
-<p:sld xmlns:a="http://schemas.openxmlformats.org/drawingml/2006/main" xmlns:r="http://schemas.openxmlformats.org/officeDocument/2006/relationships" xmlns:p="http://schemas.openxmlformats.org/presentationml/2006/main">
-  <p:cSld>
-    <p:spTree>
-      <p:nvGrpSpPr>
-        <p:cNvPr id="1" name=""/>
-        <p:cNvGrpSpPr/>
-        <p:nvPr/>
-      </p:nvGrpSpPr>
-      <p:grpSpPr>
-        <a:xfrm>
-          <a:off x="0" y="0"/>
-          <a:ext cx="0" cy="0"/>
-          <a:chOff x="0" y="0"/>
-          <a:chExt cx="0" cy="0"/>
-        </a:xfrm>
-      </p:grpSpPr>
-      <p:sp>
-        <p:nvSpPr>
-          <p:cNvPr id="2" name="Título 1"/>
-          <p:cNvSpPr>
-            <a:spLocks noGrp="1"/>
-          </p:cNvSpPr>
-          <p:nvPr>
-            <p:ph type="title"/>
-          </p:nvPr>
-        </p:nvSpPr>
-        <p:spPr/>
-        <p:txBody>
-          <a:bodyPr/>
-          <a:lstStyle/>
-          <a:p>
-            <a:r>
-              <a:rPr lang="pt-BR" dirty="0" smtClean="0"/>
-              <a:t>Tabela dos Pesos</a:t>
-            </a:r>
-            <a:endParaRPr lang="pt-BR" dirty="0"/>
-          </a:p>
-        </p:txBody>
-      </p:sp>
-      <p:pic>
-        <p:nvPicPr>
-          <p:cNvPr id="1026" name="Picture 2"/>
-          <p:cNvPicPr>
-            <a:picLocks noGrp="1" noChangeAspect="1" noChangeArrowheads="1"/>
-          </p:cNvPicPr>
-          <p:nvPr>
-            <p:ph idx="1"/>
-          </p:nvPr>
-        </p:nvPicPr>
-        <p:blipFill>
-          <a:blip r:embed="rId2" cstate="print">
-            <a:extLst>
-              <a:ext uri="{28A0092B-C50C-407E-A947-70E740481C1C}">
-                <a14:useLocalDpi xmlns:a14="http://schemas.microsoft.com/office/drawing/2010/main" xmlns="" val="0"/>
-              </a:ext>
-            </a:extLst>
-          </a:blip>
-          <a:srcRect/>
-          <a:stretch>
-            <a:fillRect/>
-          </a:stretch>
-        </p:blipFill>
-        <p:spPr bwMode="auto">
-          <a:xfrm>
-            <a:off x="1907704" y="1244078"/>
-            <a:ext cx="5400600" cy="5456468"/>
-          </a:xfrm>
-          <a:prstGeom prst="rect">
-            <a:avLst/>
-          </a:prstGeom>
-          <a:noFill/>
-          <a:ln>
-            <a:noFill/>
-          </a:ln>
-          <a:extLst>
-            <a:ext uri="{909E8E84-426E-40DD-AFC4-6F175D3DCCD1}">
-              <a14:hiddenFill xmlns:a14="http://schemas.microsoft.com/office/drawing/2010/main" xmlns="">
-                <a:solidFill>
-                  <a:schemeClr val="accent1"/>
-                </a:solidFill>
-              </a14:hiddenFill>
-            </a:ext>
-            <a:ext uri="{91240B29-F687-4F45-9708-019B960494DF}">
-              <a14:hiddenLine xmlns:a14="http://schemas.microsoft.com/office/drawing/2010/main" xmlns="" w="9525">
-                <a:solidFill>
-                  <a:schemeClr val="tx1"/>
-                </a:solidFill>
-                <a:miter lim="800000"/>
-                <a:headEnd/>
-                <a:tailEnd/>
-              </a14:hiddenLine>
-            </a:ext>
-          </a:extLst>
-        </p:spPr>
-      </p:pic>
-    </p:spTree>
-    <p:extLst>
-      <p:ext uri="{BB962C8B-B14F-4D97-AF65-F5344CB8AC3E}">
-        <p14:creationId xmlns:p14="http://schemas.microsoft.com/office/powerpoint/2010/main" xmlns="" val="4257421259"/>
-      </p:ext>
-    </p:extLst>
-  </p:cSld>
-  <p:clrMapOvr>
-    <a:masterClrMapping/>
-  </p:clrMapOvr>
-  <p:timing>
-    <p:tnLst>
-      <p:par>
-        <p:cTn id="1" dur="indefinite" restart="never" nodeType="tmRoot">
-          <p:childTnLst>
-            <p:seq concurrent="1" nextAc="seek">
-              <p:cTn id="2" dur="indefinite" nodeType="mainSeq">
-                <p:childTnLst>
-                  <p:par>
-                    <p:cTn id="3" fill="hold">
-                      <p:stCondLst>
-                        <p:cond delay="indefinite"/>
-                      </p:stCondLst>
-                      <p:childTnLst>
-                        <p:par>
-                          <p:cTn id="4" fill="hold">
-                            <p:stCondLst>
-                              <p:cond delay="0"/>
-                            </p:stCondLst>
-                            <p:childTnLst>
-                              <p:par>
-                                <p:cTn id="5" presetID="22" presetClass="entr" presetSubtype="4" fill="hold" nodeType="clickEffect">
-                                  <p:stCondLst>
-                                    <p:cond delay="0"/>
-                                  </p:stCondLst>
-                                  <p:childTnLst>
-                                    <p:set>
-                                      <p:cBhvr>
-                                        <p:cTn id="6" dur="1" fill="hold">
-                                          <p:stCondLst>
-                                            <p:cond delay="0"/>
-                                          </p:stCondLst>
-                                        </p:cTn>
-                                        <p:tgtEl>
-                                          <p:spTgt spid="1026"/>
-                                        </p:tgtEl>
-                                        <p:attrNameLst>
-                                          <p:attrName>style.visibility</p:attrName>
-                                        </p:attrNameLst>
-                                      </p:cBhvr>
-                                      <p:to>
-                                        <p:strVal val="visible"/>
-                                      </p:to>
-                                    </p:set>
-                                    <p:animEffect transition="in" filter="wipe(down)">
-                                      <p:cBhvr>
-                                        <p:cTn id="7" dur="500"/>
-                                        <p:tgtEl>
-                                          <p:spTgt spid="1026"/>
-                                        </p:tgtEl>
-                                      </p:cBhvr>
-                                    </p:animEffect>
-                                  </p:childTnLst>
-                                </p:cTn>
-                              </p:par>
-                            </p:childTnLst>
-                          </p:cTn>
-                        </p:par>
-                      </p:childTnLst>
-                    </p:cTn>
-                  </p:par>
-                </p:childTnLst>
-              </p:cTn>
-              <p:prevCondLst>
-                <p:cond evt="onPrev" delay="0">
-                  <p:tgtEl>
-                    <p:sldTgt/>
-                  </p:tgtEl>
-                </p:cond>
-              </p:prevCondLst>
-              <p:nextCondLst>
-                <p:cond evt="onNext" delay="0">
-                  <p:tgtEl>
-                    <p:sldTgt/>
-                  </p:tgtEl>
-                </p:cond>
-              </p:nextCondLst>
-            </p:seq>
-          </p:childTnLst>
-        </p:cTn>
-      </p:par>
-    </p:tnLst>
   </p:timing>
 </p:sld>
 </file>

</xml_diff>